<commit_message>
endra på den nye branchen
</commit_message>
<xml_diff>
--- a/Test1.pptx
+++ b/Test1.pptx
@@ -5,14 +5,15 @@
     <p:sldMasterId id="2147483648" r:id="rId1"/>
   </p:sldMasterIdLst>
   <p:notesMasterIdLst>
-    <p:notesMasterId r:id="rId7"/>
+    <p:notesMasterId r:id="rId8"/>
   </p:notesMasterIdLst>
   <p:sldIdLst>
     <p:sldId id="256" r:id="rId2"/>
     <p:sldId id="2147469206" r:id="rId3"/>
     <p:sldId id="2145705849" r:id="rId4"/>
-    <p:sldId id="2145705883" r:id="rId5"/>
-    <p:sldId id="2147471420" r:id="rId6"/>
+    <p:sldId id="2147471421" r:id="rId5"/>
+    <p:sldId id="2145705883" r:id="rId6"/>
+    <p:sldId id="2147471420" r:id="rId7"/>
   </p:sldIdLst>
   <p:sldSz cx="12192000" cy="6858000"/>
   <p:notesSz cx="6858000" cy="9144000"/>
@@ -617,7 +618,7 @@
           <a:p>
             <a:fld id="{2F99E83D-10BD-4912-838C-C14C2B9472B3}" type="slidenum">
               <a:rPr lang="fr-FR" smtClean="0"/>
-              <a:t>4</a:t>
+              <a:t>5</a:t>
             </a:fld>
             <a:endParaRPr lang="fr-FR"/>
           </a:p>
@@ -701,7 +702,7 @@
           <a:p>
             <a:fld id="{2F99E83D-10BD-4912-838C-C14C2B9472B3}" type="slidenum">
               <a:rPr lang="fr-FR" smtClean="0"/>
-              <a:t>5</a:t>
+              <a:t>6</a:t>
             </a:fld>
             <a:endParaRPr lang="fr-FR"/>
           </a:p>
@@ -5847,6 +5848,766 @@
           <a:chExt cx="0" cy="0"/>
         </a:xfrm>
       </p:grpSpPr>
+      <p:pic>
+        <p:nvPicPr>
+          <p:cNvPr id="6" name="Picture 2" descr="No alternative text description for this image">
+            <a:extLst>
+              <a:ext uri="{FF2B5EF4-FFF2-40B4-BE49-F238E27FC236}">
+                <a16:creationId xmlns:a16="http://schemas.microsoft.com/office/drawing/2014/main" id="{1498DCF8-C89D-9A87-4E3A-AC771BE34C71}"/>
+              </a:ext>
+            </a:extLst>
+          </p:cNvPr>
+          <p:cNvPicPr>
+            <a:picLocks noChangeAspect="1" noChangeArrowheads="1"/>
+          </p:cNvPicPr>
+          <p:nvPr/>
+        </p:nvPicPr>
+        <p:blipFill>
+          <a:blip r:embed="rId2">
+            <a:extLst>
+              <a:ext uri="{28A0092B-C50C-407E-A947-70E740481C1C}">
+                <a14:useLocalDpi xmlns:a14="http://schemas.microsoft.com/office/drawing/2010/main" val="0"/>
+              </a:ext>
+            </a:extLst>
+          </a:blip>
+          <a:srcRect/>
+          <a:stretch>
+            <a:fillRect/>
+          </a:stretch>
+        </p:blipFill>
+        <p:spPr bwMode="auto">
+          <a:xfrm>
+            <a:off x="5204884" y="1809695"/>
+            <a:ext cx="6382344" cy="2674801"/>
+          </a:xfrm>
+          <a:prstGeom prst="rect">
+            <a:avLst/>
+          </a:prstGeom>
+          <a:noFill/>
+          <a:extLst>
+            <a:ext uri="{909E8E84-426E-40DD-AFC4-6F175D3DCCD1}">
+              <a14:hiddenFill xmlns:a14="http://schemas.microsoft.com/office/drawing/2010/main">
+                <a:solidFill>
+                  <a:srgbClr val="FFFFFF"/>
+                </a:solidFill>
+              </a14:hiddenFill>
+            </a:ext>
+          </a:extLst>
+        </p:spPr>
+      </p:pic>
+      <p:sp>
+        <p:nvSpPr>
+          <p:cNvPr id="7" name="TextBox 6">
+            <a:extLst>
+              <a:ext uri="{FF2B5EF4-FFF2-40B4-BE49-F238E27FC236}">
+                <a16:creationId xmlns:a16="http://schemas.microsoft.com/office/drawing/2014/main" id="{DFF446C8-FCC0-6538-E4FD-C8F64834AA3D}"/>
+              </a:ext>
+            </a:extLst>
+          </p:cNvPr>
+          <p:cNvSpPr txBox="1"/>
+          <p:nvPr/>
+        </p:nvSpPr>
+        <p:spPr>
+          <a:xfrm>
+            <a:off x="5211369" y="4513323"/>
+            <a:ext cx="6423344" cy="830997"/>
+          </a:xfrm>
+          <a:prstGeom prst="rect">
+            <a:avLst/>
+          </a:prstGeom>
+          <a:noFill/>
+        </p:spPr>
+        <p:txBody>
+          <a:bodyPr wrap="square" rtlCol="0">
+            <a:spAutoFit/>
+          </a:bodyPr>
+          <a:lstStyle/>
+          <a:p>
+            <a:pPr algn="ctr"/>
+            <a:r>
+              <a:rPr lang="nb-NO" sz="2400" b="1"/>
+              <a:t>An hehhehhtall </a:t>
+            </a:r>
+            <a:r>
+              <a:rPr lang="nb-NO" sz="2400" b="1" dirty="0"/>
+              <a:t>offentlige kjente </a:t>
+            </a:r>
+            <a:br>
+              <a:rPr lang="nb-NO" sz="2400" b="1" dirty="0"/>
+            </a:br>
+            <a:r>
+              <a:rPr lang="nb-NO" sz="2400" b="1" dirty="0"/>
+              <a:t>sårbarheter fra (2008 – 2022)</a:t>
+            </a:r>
+            <a:endParaRPr lang="en-US" sz="2400" b="1" dirty="0"/>
+          </a:p>
+        </p:txBody>
+      </p:sp>
+      <p:pic>
+        <p:nvPicPr>
+          <p:cNvPr id="9" name="Picture 8">
+            <a:extLst>
+              <a:ext uri="{FF2B5EF4-FFF2-40B4-BE49-F238E27FC236}">
+                <a16:creationId xmlns:a16="http://schemas.microsoft.com/office/drawing/2014/main" id="{9E180D4A-4A39-103C-6F71-9752F4CC1E9F}"/>
+              </a:ext>
+            </a:extLst>
+          </p:cNvPr>
+          <p:cNvPicPr>
+            <a:picLocks noChangeAspect="1"/>
+          </p:cNvPicPr>
+          <p:nvPr/>
+        </p:nvPicPr>
+        <p:blipFill>
+          <a:blip r:embed="rId3"/>
+          <a:stretch>
+            <a:fillRect/>
+          </a:stretch>
+        </p:blipFill>
+        <p:spPr>
+          <a:xfrm>
+            <a:off x="889258" y="1191222"/>
+            <a:ext cx="3468733" cy="2353783"/>
+          </a:xfrm>
+          <a:prstGeom prst="rect">
+            <a:avLst/>
+          </a:prstGeom>
+        </p:spPr>
+      </p:pic>
+      <p:sp>
+        <p:nvSpPr>
+          <p:cNvPr id="10" name="Rectangle: Rounded Corners 9">
+            <a:extLst>
+              <a:ext uri="{FF2B5EF4-FFF2-40B4-BE49-F238E27FC236}">
+                <a16:creationId xmlns:a16="http://schemas.microsoft.com/office/drawing/2014/main" id="{1A1D07CB-5607-9E57-94F9-25578605C556}"/>
+              </a:ext>
+            </a:extLst>
+          </p:cNvPr>
+          <p:cNvSpPr/>
+          <p:nvPr/>
+        </p:nvSpPr>
+        <p:spPr>
+          <a:xfrm>
+            <a:off x="921687" y="283900"/>
+            <a:ext cx="3468732" cy="938205"/>
+          </a:xfrm>
+          <a:prstGeom prst="roundRect">
+            <a:avLst/>
+          </a:prstGeom>
+          <a:solidFill>
+            <a:schemeClr val="accent2"/>
+          </a:solidFill>
+          <a:ln w="3175">
+            <a:noFill/>
+          </a:ln>
+        </p:spPr>
+        <p:style>
+          <a:lnRef idx="2">
+            <a:schemeClr val="accent1">
+              <a:shade val="50000"/>
+            </a:schemeClr>
+          </a:lnRef>
+          <a:fillRef idx="1">
+            <a:schemeClr val="accent1"/>
+          </a:fillRef>
+          <a:effectRef idx="0">
+            <a:schemeClr val="accent1"/>
+          </a:effectRef>
+          <a:fontRef idx="minor">
+            <a:schemeClr val="lt1"/>
+          </a:fontRef>
+        </p:style>
+        <p:txBody>
+          <a:bodyPr rot="0" spcFirstLastPara="0" vertOverflow="overflow" horzOverflow="overflow" vert="horz" wrap="square" lIns="91440" tIns="45720" rIns="91440" bIns="45720" numCol="1" spcCol="0" rtlCol="0" fromWordArt="0" anchor="ctr" anchorCtr="0" forceAA="0" compatLnSpc="1">
+            <a:prstTxWarp prst="textNoShape">
+              <a:avLst/>
+            </a:prstTxWarp>
+            <a:noAutofit/>
+          </a:bodyPr>
+          <a:lstStyle/>
+          <a:p>
+            <a:pPr algn="ctr"/>
+            <a:r>
+              <a:rPr lang="nb-NO" sz="2800" b="1">
+                <a:solidFill>
+                  <a:schemeClr val="bg1"/>
+                </a:solidFill>
+              </a:rPr>
+              <a:t>NSM Risiko rapport 2023</a:t>
+            </a:r>
+            <a:endParaRPr lang="en-US" sz="2800" b="1">
+              <a:solidFill>
+                <a:schemeClr val="bg1"/>
+              </a:solidFill>
+            </a:endParaRPr>
+          </a:p>
+        </p:txBody>
+      </p:sp>
+      <p:sp>
+        <p:nvSpPr>
+          <p:cNvPr id="2" name="Rectangle: Rounded Corners 1">
+            <a:extLst>
+              <a:ext uri="{FF2B5EF4-FFF2-40B4-BE49-F238E27FC236}">
+                <a16:creationId xmlns:a16="http://schemas.microsoft.com/office/drawing/2014/main" id="{4BC961B2-6C78-300F-BBAC-7DC938416930}"/>
+              </a:ext>
+            </a:extLst>
+          </p:cNvPr>
+          <p:cNvSpPr/>
+          <p:nvPr/>
+        </p:nvSpPr>
+        <p:spPr>
+          <a:xfrm>
+            <a:off x="6738026" y="1191223"/>
+            <a:ext cx="3678183" cy="1201782"/>
+          </a:xfrm>
+          <a:prstGeom prst="roundRect">
+            <a:avLst/>
+          </a:prstGeom>
+          <a:solidFill>
+            <a:schemeClr val="accent2"/>
+          </a:solidFill>
+          <a:ln w="3175">
+            <a:noFill/>
+          </a:ln>
+        </p:spPr>
+        <p:style>
+          <a:lnRef idx="2">
+            <a:schemeClr val="accent1">
+              <a:shade val="50000"/>
+            </a:schemeClr>
+          </a:lnRef>
+          <a:fillRef idx="1">
+            <a:schemeClr val="accent1"/>
+          </a:fillRef>
+          <a:effectRef idx="0">
+            <a:schemeClr val="accent1"/>
+          </a:effectRef>
+          <a:fontRef idx="minor">
+            <a:schemeClr val="lt1"/>
+          </a:fontRef>
+        </p:style>
+        <p:txBody>
+          <a:bodyPr rot="0" spcFirstLastPara="0" vertOverflow="overflow" horzOverflow="overflow" vert="horz" wrap="square" lIns="91440" tIns="45720" rIns="91440" bIns="45720" numCol="1" spcCol="0" rtlCol="0" fromWordArt="0" anchor="ctr" anchorCtr="0" forceAA="0" compatLnSpc="1">
+            <a:prstTxWarp prst="textNoShape">
+              <a:avLst/>
+            </a:prstTxWarp>
+            <a:noAutofit/>
+          </a:bodyPr>
+          <a:lstStyle/>
+          <a:p>
+            <a:pPr algn="ctr"/>
+            <a:r>
+              <a:rPr lang="nb-NO" sz="2800" b="1" dirty="0">
+                <a:solidFill>
+                  <a:schemeClr val="bg1"/>
+                </a:solidFill>
+              </a:rPr>
+              <a:t>18500 sårbarheter så langt i år </a:t>
+            </a:r>
+            <a:br>
+              <a:rPr lang="nb-NO" sz="2800" b="1" dirty="0">
+                <a:solidFill>
+                  <a:schemeClr val="bg1"/>
+                </a:solidFill>
+              </a:rPr>
+            </a:br>
+            <a:r>
+              <a:rPr lang="nb-NO" b="1" dirty="0">
+                <a:solidFill>
+                  <a:schemeClr val="bg1"/>
+                </a:solidFill>
+              </a:rPr>
+              <a:t>(som vi vet om)</a:t>
+            </a:r>
+            <a:endParaRPr lang="en-US" sz="2800" b="1" dirty="0">
+              <a:solidFill>
+                <a:schemeClr val="bg1"/>
+              </a:solidFill>
+            </a:endParaRPr>
+          </a:p>
+        </p:txBody>
+      </p:sp>
+      <p:pic>
+        <p:nvPicPr>
+          <p:cNvPr id="4" name="Picture 3">
+            <a:extLst>
+              <a:ext uri="{FF2B5EF4-FFF2-40B4-BE49-F238E27FC236}">
+                <a16:creationId xmlns:a16="http://schemas.microsoft.com/office/drawing/2014/main" id="{61A5ECE6-CF8D-C393-7AD3-F7039963691E}"/>
+              </a:ext>
+            </a:extLst>
+          </p:cNvPr>
+          <p:cNvPicPr>
+            <a:picLocks noChangeAspect="1"/>
+          </p:cNvPicPr>
+          <p:nvPr/>
+        </p:nvPicPr>
+        <p:blipFill>
+          <a:blip r:embed="rId4"/>
+          <a:stretch>
+            <a:fillRect/>
+          </a:stretch>
+        </p:blipFill>
+        <p:spPr>
+          <a:xfrm>
+            <a:off x="499354" y="4809659"/>
+            <a:ext cx="4529848" cy="1620975"/>
+          </a:xfrm>
+          <a:prstGeom prst="rect">
+            <a:avLst/>
+          </a:prstGeom>
+        </p:spPr>
+      </p:pic>
+      <p:sp>
+        <p:nvSpPr>
+          <p:cNvPr id="5" name="Rectangle: Rounded Corners 4">
+            <a:extLst>
+              <a:ext uri="{FF2B5EF4-FFF2-40B4-BE49-F238E27FC236}">
+                <a16:creationId xmlns:a16="http://schemas.microsoft.com/office/drawing/2014/main" id="{815A321E-ED23-9098-789D-61A0D0035B92}"/>
+              </a:ext>
+            </a:extLst>
+          </p:cNvPr>
+          <p:cNvSpPr/>
+          <p:nvPr/>
+        </p:nvSpPr>
+        <p:spPr>
+          <a:xfrm>
+            <a:off x="973584" y="3657601"/>
+            <a:ext cx="3416835" cy="1213824"/>
+          </a:xfrm>
+          <a:prstGeom prst="roundRect">
+            <a:avLst/>
+          </a:prstGeom>
+          <a:solidFill>
+            <a:schemeClr val="accent2"/>
+          </a:solidFill>
+          <a:ln w="3175">
+            <a:noFill/>
+          </a:ln>
+        </p:spPr>
+        <p:style>
+          <a:lnRef idx="2">
+            <a:schemeClr val="accent1">
+              <a:shade val="50000"/>
+            </a:schemeClr>
+          </a:lnRef>
+          <a:fillRef idx="1">
+            <a:schemeClr val="accent1"/>
+          </a:fillRef>
+          <a:effectRef idx="0">
+            <a:schemeClr val="accent1"/>
+          </a:effectRef>
+          <a:fontRef idx="minor">
+            <a:schemeClr val="lt1"/>
+          </a:fontRef>
+        </p:style>
+        <p:txBody>
+          <a:bodyPr rot="0" spcFirstLastPara="0" vertOverflow="overflow" horzOverflow="overflow" vert="horz" wrap="square" lIns="91440" tIns="45720" rIns="91440" bIns="45720" numCol="1" spcCol="0" rtlCol="0" fromWordArt="0" anchor="ctr" anchorCtr="0" forceAA="0" compatLnSpc="1">
+            <a:prstTxWarp prst="textNoShape">
+              <a:avLst/>
+            </a:prstTxWarp>
+            <a:noAutofit/>
+          </a:bodyPr>
+          <a:lstStyle/>
+          <a:p>
+            <a:pPr algn="ctr"/>
+            <a:r>
+              <a:rPr lang="nb-NO" sz="2800" b="1">
+                <a:solidFill>
+                  <a:schemeClr val="bg1"/>
+                </a:solidFill>
+              </a:rPr>
+              <a:t>Telenor Digital Risiko rapport 2023</a:t>
+            </a:r>
+            <a:endParaRPr lang="en-US" sz="2800" b="1">
+              <a:solidFill>
+                <a:schemeClr val="bg1"/>
+              </a:solidFill>
+            </a:endParaRPr>
+          </a:p>
+        </p:txBody>
+      </p:sp>
+      <p:sp>
+        <p:nvSpPr>
+          <p:cNvPr id="3" name="Rectangle: Rounded Corners 2">
+            <a:extLst>
+              <a:ext uri="{FF2B5EF4-FFF2-40B4-BE49-F238E27FC236}">
+                <a16:creationId xmlns:a16="http://schemas.microsoft.com/office/drawing/2014/main" id="{997D28A9-5CC0-70BF-1D71-CD0E29F527DC}"/>
+              </a:ext>
+            </a:extLst>
+          </p:cNvPr>
+          <p:cNvSpPr/>
+          <p:nvPr/>
+        </p:nvSpPr>
+        <p:spPr>
+          <a:xfrm>
+            <a:off x="5029202" y="2227218"/>
+            <a:ext cx="3678183" cy="1201782"/>
+          </a:xfrm>
+          <a:prstGeom prst="roundRect">
+            <a:avLst/>
+          </a:prstGeom>
+          <a:solidFill>
+            <a:schemeClr val="accent2"/>
+          </a:solidFill>
+          <a:ln w="3175">
+            <a:noFill/>
+          </a:ln>
+        </p:spPr>
+        <p:style>
+          <a:lnRef idx="2">
+            <a:schemeClr val="accent1">
+              <a:shade val="50000"/>
+            </a:schemeClr>
+          </a:lnRef>
+          <a:fillRef idx="1">
+            <a:schemeClr val="accent1"/>
+          </a:fillRef>
+          <a:effectRef idx="0">
+            <a:schemeClr val="accent1"/>
+          </a:effectRef>
+          <a:fontRef idx="minor">
+            <a:schemeClr val="lt1"/>
+          </a:fontRef>
+        </p:style>
+        <p:txBody>
+          <a:bodyPr rot="0" spcFirstLastPara="0" vertOverflow="overflow" horzOverflow="overflow" vert="horz" wrap="square" lIns="91440" tIns="45720" rIns="91440" bIns="45720" numCol="1" spcCol="0" rtlCol="0" fromWordArt="0" anchor="ctr" anchorCtr="0" forceAA="0" compatLnSpc="1">
+            <a:prstTxWarp prst="textNoShape">
+              <a:avLst/>
+            </a:prstTxWarp>
+            <a:noAutofit/>
+          </a:bodyPr>
+          <a:lstStyle/>
+          <a:p>
+            <a:pPr algn="ctr"/>
+            <a:r>
+              <a:rPr lang="nb-NO" sz="2800" b="1" dirty="0">
+                <a:solidFill>
+                  <a:schemeClr val="bg1"/>
+                </a:solidFill>
+              </a:rPr>
+              <a:t>18500 sårbarheter så langt i år </a:t>
+            </a:r>
+            <a:br>
+              <a:rPr lang="nb-NO" sz="2800" b="1" dirty="0">
+                <a:solidFill>
+                  <a:schemeClr val="bg1"/>
+                </a:solidFill>
+              </a:rPr>
+            </a:br>
+            <a:r>
+              <a:rPr lang="nb-NO" b="1" dirty="0">
+                <a:solidFill>
+                  <a:schemeClr val="bg1"/>
+                </a:solidFill>
+              </a:rPr>
+              <a:t>(som vi vet om)</a:t>
+            </a:r>
+            <a:endParaRPr lang="en-US" sz="2800" b="1" dirty="0">
+              <a:solidFill>
+                <a:schemeClr val="bg1"/>
+              </a:solidFill>
+            </a:endParaRPr>
+          </a:p>
+        </p:txBody>
+      </p:sp>
+      <p:sp>
+        <p:nvSpPr>
+          <p:cNvPr id="8" name="TextBox 7">
+            <a:extLst>
+              <a:ext uri="{FF2B5EF4-FFF2-40B4-BE49-F238E27FC236}">
+                <a16:creationId xmlns:a16="http://schemas.microsoft.com/office/drawing/2014/main" id="{4A045D72-2D2D-3B3C-9A35-58D41FB22A78}"/>
+              </a:ext>
+            </a:extLst>
+          </p:cNvPr>
+          <p:cNvSpPr txBox="1"/>
+          <p:nvPr/>
+        </p:nvSpPr>
+        <p:spPr>
+          <a:xfrm>
+            <a:off x="1439839" y="5149504"/>
+            <a:ext cx="6423344" cy="830997"/>
+          </a:xfrm>
+          <a:prstGeom prst="rect">
+            <a:avLst/>
+          </a:prstGeom>
+          <a:noFill/>
+        </p:spPr>
+        <p:txBody>
+          <a:bodyPr wrap="square" rtlCol="0">
+            <a:spAutoFit/>
+          </a:bodyPr>
+          <a:lstStyle/>
+          <a:p>
+            <a:pPr algn="ctr"/>
+            <a:r>
+              <a:rPr lang="nb-NO" sz="2400" b="1" dirty="0"/>
+              <a:t>Antall offentlige kjente </a:t>
+            </a:r>
+            <a:br>
+              <a:rPr lang="nb-NO" sz="2400" b="1" dirty="0"/>
+            </a:br>
+            <a:r>
+              <a:rPr lang="nb-NO" sz="2400" b="1" dirty="0"/>
+              <a:t>sårbarheter fra (2008 – 2022)</a:t>
+            </a:r>
+            <a:endParaRPr lang="en-US" sz="2400" b="1" dirty="0"/>
+          </a:p>
+        </p:txBody>
+      </p:sp>
+    </p:spTree>
+    <p:extLst>
+      <p:ext uri="{BB962C8B-B14F-4D97-AF65-F5344CB8AC3E}">
+        <p14:creationId xmlns:p14="http://schemas.microsoft.com/office/powerpoint/2010/main" val="3403538109"/>
+      </p:ext>
+    </p:extLst>
+  </p:cSld>
+  <p:clrMapOvr>
+    <a:masterClrMapping/>
+  </p:clrMapOvr>
+  <p:timing>
+    <p:tnLst>
+      <p:par>
+        <p:cTn id="1" dur="indefinite" restart="never" nodeType="tmRoot">
+          <p:childTnLst>
+            <p:seq concurrent="1" nextAc="seek">
+              <p:cTn id="2" dur="indefinite" nodeType="mainSeq">
+                <p:childTnLst>
+                  <p:par>
+                    <p:cTn id="3" fill="hold">
+                      <p:stCondLst>
+                        <p:cond delay="indefinite"/>
+                      </p:stCondLst>
+                      <p:childTnLst>
+                        <p:par>
+                          <p:cTn id="4" fill="hold">
+                            <p:stCondLst>
+                              <p:cond delay="0"/>
+                            </p:stCondLst>
+                            <p:childTnLst>
+                              <p:par>
+                                <p:cTn id="5" presetID="1" presetClass="entr" presetSubtype="0" fill="hold" nodeType="clickEffect">
+                                  <p:stCondLst>
+                                    <p:cond delay="0"/>
+                                  </p:stCondLst>
+                                  <p:childTnLst>
+                                    <p:set>
+                                      <p:cBhvr>
+                                        <p:cTn id="6" dur="1" fill="hold">
+                                          <p:stCondLst>
+                                            <p:cond delay="0"/>
+                                          </p:stCondLst>
+                                        </p:cTn>
+                                        <p:tgtEl>
+                                          <p:spTgt spid="6"/>
+                                        </p:tgtEl>
+                                        <p:attrNameLst>
+                                          <p:attrName>style.visibility</p:attrName>
+                                        </p:attrNameLst>
+                                      </p:cBhvr>
+                                      <p:to>
+                                        <p:strVal val="visible"/>
+                                      </p:to>
+                                    </p:set>
+                                  </p:childTnLst>
+                                </p:cTn>
+                              </p:par>
+                              <p:par>
+                                <p:cTn id="7" presetID="1" presetClass="entr" presetSubtype="0" fill="hold" grpId="0" nodeType="withEffect">
+                                  <p:stCondLst>
+                                    <p:cond delay="0"/>
+                                  </p:stCondLst>
+                                  <p:childTnLst>
+                                    <p:set>
+                                      <p:cBhvr>
+                                        <p:cTn id="8" dur="1" fill="hold">
+                                          <p:stCondLst>
+                                            <p:cond delay="0"/>
+                                          </p:stCondLst>
+                                        </p:cTn>
+                                        <p:tgtEl>
+                                          <p:spTgt spid="7"/>
+                                        </p:tgtEl>
+                                        <p:attrNameLst>
+                                          <p:attrName>style.visibility</p:attrName>
+                                        </p:attrNameLst>
+                                      </p:cBhvr>
+                                      <p:to>
+                                        <p:strVal val="visible"/>
+                                      </p:to>
+                                    </p:set>
+                                  </p:childTnLst>
+                                </p:cTn>
+                              </p:par>
+                            </p:childTnLst>
+                          </p:cTn>
+                        </p:par>
+                      </p:childTnLst>
+                    </p:cTn>
+                  </p:par>
+                  <p:par>
+                    <p:cTn id="9" fill="hold">
+                      <p:stCondLst>
+                        <p:cond delay="indefinite"/>
+                      </p:stCondLst>
+                      <p:childTnLst>
+                        <p:par>
+                          <p:cTn id="10" fill="hold">
+                            <p:stCondLst>
+                              <p:cond delay="0"/>
+                            </p:stCondLst>
+                            <p:childTnLst>
+                              <p:par>
+                                <p:cTn id="11" presetID="1" presetClass="entr" presetSubtype="0" fill="hold" grpId="0" nodeType="clickEffect">
+                                  <p:stCondLst>
+                                    <p:cond delay="0"/>
+                                  </p:stCondLst>
+                                  <p:childTnLst>
+                                    <p:set>
+                                      <p:cBhvr>
+                                        <p:cTn id="12" dur="1" fill="hold">
+                                          <p:stCondLst>
+                                            <p:cond delay="0"/>
+                                          </p:stCondLst>
+                                        </p:cTn>
+                                        <p:tgtEl>
+                                          <p:spTgt spid="2"/>
+                                        </p:tgtEl>
+                                        <p:attrNameLst>
+                                          <p:attrName>style.visibility</p:attrName>
+                                        </p:attrNameLst>
+                                      </p:cBhvr>
+                                      <p:to>
+                                        <p:strVal val="visible"/>
+                                      </p:to>
+                                    </p:set>
+                                  </p:childTnLst>
+                                </p:cTn>
+                              </p:par>
+                            </p:childTnLst>
+                          </p:cTn>
+                        </p:par>
+                      </p:childTnLst>
+                    </p:cTn>
+                  </p:par>
+                  <p:par>
+                    <p:cTn id="13" fill="hold">
+                      <p:stCondLst>
+                        <p:cond delay="indefinite"/>
+                      </p:stCondLst>
+                      <p:childTnLst>
+                        <p:par>
+                          <p:cTn id="14" fill="hold">
+                            <p:stCondLst>
+                              <p:cond delay="0"/>
+                            </p:stCondLst>
+                            <p:childTnLst>
+                              <p:par>
+                                <p:cTn id="15" presetID="1" presetClass="entr" presetSubtype="0" fill="hold" grpId="0" nodeType="clickEffect">
+                                  <p:stCondLst>
+                                    <p:cond delay="0"/>
+                                  </p:stCondLst>
+                                  <p:childTnLst>
+                                    <p:set>
+                                      <p:cBhvr>
+                                        <p:cTn id="16" dur="1" fill="hold">
+                                          <p:stCondLst>
+                                            <p:cond delay="0"/>
+                                          </p:stCondLst>
+                                        </p:cTn>
+                                        <p:tgtEl>
+                                          <p:spTgt spid="3"/>
+                                        </p:tgtEl>
+                                        <p:attrNameLst>
+                                          <p:attrName>style.visibility</p:attrName>
+                                        </p:attrNameLst>
+                                      </p:cBhvr>
+                                      <p:to>
+                                        <p:strVal val="visible"/>
+                                      </p:to>
+                                    </p:set>
+                                  </p:childTnLst>
+                                </p:cTn>
+                              </p:par>
+                              <p:par>
+                                <p:cTn id="17" presetID="1" presetClass="entr" presetSubtype="0" fill="hold" grpId="0" nodeType="withEffect">
+                                  <p:stCondLst>
+                                    <p:cond delay="0"/>
+                                  </p:stCondLst>
+                                  <p:childTnLst>
+                                    <p:set>
+                                      <p:cBhvr>
+                                        <p:cTn id="18" dur="1" fill="hold">
+                                          <p:stCondLst>
+                                            <p:cond delay="0"/>
+                                          </p:stCondLst>
+                                        </p:cTn>
+                                        <p:tgtEl>
+                                          <p:spTgt spid="8"/>
+                                        </p:tgtEl>
+                                        <p:attrNameLst>
+                                          <p:attrName>style.visibility</p:attrName>
+                                        </p:attrNameLst>
+                                      </p:cBhvr>
+                                      <p:to>
+                                        <p:strVal val="visible"/>
+                                      </p:to>
+                                    </p:set>
+                                  </p:childTnLst>
+                                </p:cTn>
+                              </p:par>
+                            </p:childTnLst>
+                          </p:cTn>
+                        </p:par>
+                      </p:childTnLst>
+                    </p:cTn>
+                  </p:par>
+                </p:childTnLst>
+              </p:cTn>
+              <p:prevCondLst>
+                <p:cond evt="onPrev" delay="0">
+                  <p:tgtEl>
+                    <p:sldTgt/>
+                  </p:tgtEl>
+                </p:cond>
+              </p:prevCondLst>
+              <p:nextCondLst>
+                <p:cond evt="onNext" delay="0">
+                  <p:tgtEl>
+                    <p:sldTgt/>
+                  </p:tgtEl>
+                </p:cond>
+              </p:nextCondLst>
+            </p:seq>
+          </p:childTnLst>
+        </p:cTn>
+      </p:par>
+    </p:tnLst>
+    <p:bldLst>
+      <p:bldP spid="7" grpId="0"/>
+      <p:bldP spid="2" grpId="0" animBg="1"/>
+      <p:bldP spid="3" grpId="0" animBg="1"/>
+      <p:bldP spid="8" grpId="0"/>
+    </p:bldLst>
+  </p:timing>
+</p:sld>
+</file>
+
+<file path=ppt/slides/slide5.xml><?xml version="1.0" encoding="utf-8"?>
+<p:sld xmlns:a="http://schemas.openxmlformats.org/drawingml/2006/main" xmlns:r="http://schemas.openxmlformats.org/officeDocument/2006/relationships" xmlns:p="http://schemas.openxmlformats.org/presentationml/2006/main">
+  <p:cSld>
+    <p:spTree>
+      <p:nvGrpSpPr>
+        <p:cNvPr id="1" name=""/>
+        <p:cNvGrpSpPr/>
+        <p:nvPr/>
+      </p:nvGrpSpPr>
+      <p:grpSpPr>
+        <a:xfrm>
+          <a:off x="0" y="0"/>
+          <a:ext cx="0" cy="0"/>
+          <a:chOff x="0" y="0"/>
+          <a:chExt cx="0" cy="0"/>
+        </a:xfrm>
+      </p:grpSpPr>
       <p:sp>
         <p:nvSpPr>
           <p:cNvPr id="2" name="Content Placeholder 1">
@@ -7783,7 +8544,7 @@
 </p:sld>
 </file>
 
-<file path=ppt/slides/slide5.xml><?xml version="1.0" encoding="utf-8"?>
+<file path=ppt/slides/slide6.xml><?xml version="1.0" encoding="utf-8"?>
 <p:sld xmlns:a="http://schemas.openxmlformats.org/drawingml/2006/main" xmlns:r="http://schemas.openxmlformats.org/officeDocument/2006/relationships" xmlns:p="http://schemas.openxmlformats.org/presentationml/2006/main">
   <p:cSld>
     <p:spTree>
@@ -7829,10 +8590,10 @@
           <a:lstStyle/>
           <a:p>
             <a:r>
-              <a:rPr lang="nb-NO" sz="3200"/>
+              <a:rPr lang="nb-NO" sz="3200" dirty="0"/>
               <a:t>«Alle» Leverandører skal ha GPT funksjonalitet</a:t>
             </a:r>
-            <a:endParaRPr lang="en-US" sz="3200"/>
+            <a:endParaRPr lang="en-US" sz="3200" dirty="0"/>
           </a:p>
         </p:txBody>
       </p:sp>
@@ -7947,7 +8708,10 @@
             <a:avLst/>
           </a:prstGeom>
           <a:solidFill>
-            <a:schemeClr val="accent2"/>
+            <a:schemeClr val="accent1">
+              <a:lumMod val="60000"/>
+              <a:lumOff val="40000"/>
+            </a:schemeClr>
           </a:solidFill>
           <a:ln w="3175">
             <a:noFill/>
@@ -7980,18 +8744,109 @@
           <a:p>
             <a:pPr algn="ctr"/>
             <a:r>
-              <a:rPr lang="nb-NO" sz="2800" b="1">
+              <a:rPr lang="nb-NO" sz="2800" b="1" dirty="0">
                 <a:solidFill>
                   <a:schemeClr val="bg1"/>
                 </a:solidFill>
               </a:rPr>
               <a:t>Handler om å forenkle informasjon</a:t>
             </a:r>
-            <a:endParaRPr lang="en-US" sz="2800" b="1">
+            <a:endParaRPr lang="en-US" sz="2800" b="1" dirty="0">
               <a:solidFill>
                 <a:schemeClr val="bg1"/>
               </a:solidFill>
             </a:endParaRPr>
+          </a:p>
+        </p:txBody>
+      </p:sp>
+      <p:sp>
+        <p:nvSpPr>
+          <p:cNvPr id="4" name="Title 2">
+            <a:extLst>
+              <a:ext uri="{FF2B5EF4-FFF2-40B4-BE49-F238E27FC236}">
+                <a16:creationId xmlns:a16="http://schemas.microsoft.com/office/drawing/2014/main" id="{F7CBAFCD-DF74-5D1D-FE74-F5D485A2DF87}"/>
+              </a:ext>
+            </a:extLst>
+          </p:cNvPr>
+          <p:cNvSpPr txBox="1">
+            <a:spLocks/>
+          </p:cNvSpPr>
+          <p:nvPr/>
+        </p:nvSpPr>
+        <p:spPr bwMode="auto">
+          <a:xfrm>
+            <a:off x="482764" y="858696"/>
+            <a:ext cx="11182351" cy="705519"/>
+          </a:xfrm>
+          <a:prstGeom prst="rect">
+            <a:avLst/>
+          </a:prstGeom>
+          <a:noFill/>
+          <a:ln>
+            <a:noFill/>
+          </a:ln>
+          <a:effectLst/>
+          <a:extLst>
+            <a:ext uri="{909E8E84-426E-40DD-AFC4-6F175D3DCCD1}">
+              <a14:hiddenFill xmlns:a14="http://schemas.microsoft.com/office/drawing/2010/main">
+                <a:solidFill>
+                  <a:schemeClr val="accent1"/>
+                </a:solidFill>
+              </a14:hiddenFill>
+            </a:ext>
+            <a:ext uri="{91240B29-F687-4F45-9708-019B960494DF}">
+              <a14:hiddenLine xmlns:a14="http://schemas.microsoft.com/office/drawing/2010/main" w="9525">
+                <a:solidFill>
+                  <a:schemeClr val="tx1"/>
+                </a:solidFill>
+                <a:miter lim="800000"/>
+                <a:headEnd/>
+                <a:tailEnd/>
+              </a14:hiddenLine>
+            </a:ext>
+            <a:ext uri="{AF507438-7753-43E0-B8FC-AC1667EBCBE1}">
+              <a14:hiddenEffects xmlns:a14="http://schemas.microsoft.com/office/drawing/2010/main">
+                <a:effectLst>
+                  <a:outerShdw dist="35921" dir="2700000" algn="ctr" rotWithShape="0">
+                    <a:schemeClr val="bg2"/>
+                  </a:outerShdw>
+                </a:effectLst>
+              </a14:hiddenEffects>
+            </a:ext>
+          </a:extLst>
+        </p:spPr>
+        <p:txBody>
+          <a:bodyPr vert="horz" wrap="square" lIns="91440" tIns="45720" rIns="91440" bIns="45720" numCol="1" rtlCol="0" anchor="b" anchorCtr="0" compatLnSpc="1">
+            <a:prstTxWarp prst="textNoShape">
+              <a:avLst/>
+            </a:prstTxWarp>
+            <a:normAutofit/>
+          </a:bodyPr>
+          <a:lstStyle>
+            <a:lvl1pPr algn="l" defTabSz="914400" rtl="0" eaLnBrk="1" latinLnBrk="0" hangingPunct="1">
+              <a:lnSpc>
+                <a:spcPct val="90000"/>
+              </a:lnSpc>
+              <a:spcBef>
+                <a:spcPct val="0"/>
+              </a:spcBef>
+              <a:buNone/>
+              <a:defRPr sz="4400" kern="1200">
+                <a:solidFill>
+                  <a:schemeClr val="tx1"/>
+                </a:solidFill>
+                <a:latin typeface="+mj-lt"/>
+                <a:ea typeface="+mj-ea"/>
+                <a:cs typeface="+mj-cs"/>
+              </a:defRPr>
+            </a:lvl1pPr>
+          </a:lstStyle>
+          <a:p>
+            <a:r>
+              <a:rPr lang="nb-NO" sz="3200" dirty="0"/>
+              <a:t>Branch 1 endring – lyseblå boks nede</a:t>
+            </a:r>
+            <a:endParaRPr lang="en-US" sz="3200" dirty="0"/>
           </a:p>
         </p:txBody>
       </p:sp>

</xml_diff>

<commit_message>
gjorde branch 2 endringene med red boks osv
</commit_message>
<xml_diff>
--- a/Test1.pptx
+++ b/Test1.pptx
@@ -5,7 +5,7 @@
     <p:sldMasterId id="2147483648" r:id="rId1"/>
   </p:sldMasterIdLst>
   <p:notesMasterIdLst>
-    <p:notesMasterId r:id="rId7"/>
+    <p:notesMasterId r:id="rId8"/>
   </p:notesMasterIdLst>
   <p:sldIdLst>
     <p:sldId id="256" r:id="rId2"/>
@@ -13,6 +13,7 @@
     <p:sldId id="2145705849" r:id="rId4"/>
     <p:sldId id="2145705883" r:id="rId5"/>
     <p:sldId id="2147471420" r:id="rId6"/>
+    <p:sldId id="2147471421" r:id="rId7"/>
   </p:sldIdLst>
   <p:sldSz cx="12192000" cy="6858000"/>
   <p:notesSz cx="6858000" cy="9144000"/>
@@ -711,6 +712,90 @@
     <p:extLst>
       <p:ext uri="{BB962C8B-B14F-4D97-AF65-F5344CB8AC3E}">
         <p14:creationId xmlns:p14="http://schemas.microsoft.com/office/powerpoint/2010/main" val="3826965134"/>
+      </p:ext>
+    </p:extLst>
+  </p:cSld>
+  <p:clrMapOvr>
+    <a:masterClrMapping/>
+  </p:clrMapOvr>
+</p:notes>
+</file>
+
+<file path=ppt/notesSlides/notesSlide4.xml><?xml version="1.0" encoding="utf-8"?>
+<p:notes xmlns:a="http://schemas.openxmlformats.org/drawingml/2006/main" xmlns:r="http://schemas.openxmlformats.org/officeDocument/2006/relationships" xmlns:p="http://schemas.openxmlformats.org/presentationml/2006/main">
+  <p:cSld>
+    <p:spTree>
+      <p:nvGrpSpPr>
+        <p:cNvPr id="1" name=""/>
+        <p:cNvGrpSpPr/>
+        <p:nvPr/>
+      </p:nvGrpSpPr>
+      <p:grpSpPr>
+        <a:xfrm>
+          <a:off x="0" y="0"/>
+          <a:ext cx="0" cy="0"/>
+          <a:chOff x="0" y="0"/>
+          <a:chExt cx="0" cy="0"/>
+        </a:xfrm>
+      </p:grpSpPr>
+      <p:sp>
+        <p:nvSpPr>
+          <p:cNvPr id="2" name="Slide Image Placeholder 1"/>
+          <p:cNvSpPr>
+            <a:spLocks noGrp="1" noRot="1" noChangeAspect="1"/>
+          </p:cNvSpPr>
+          <p:nvPr>
+            <p:ph type="sldImg"/>
+          </p:nvPr>
+        </p:nvSpPr>
+        <p:spPr/>
+      </p:sp>
+      <p:sp>
+        <p:nvSpPr>
+          <p:cNvPr id="3" name="Notes Placeholder 2"/>
+          <p:cNvSpPr>
+            <a:spLocks noGrp="1"/>
+          </p:cNvSpPr>
+          <p:nvPr>
+            <p:ph type="body" idx="1"/>
+          </p:nvPr>
+        </p:nvSpPr>
+        <p:spPr/>
+        <p:txBody>
+          <a:bodyPr/>
+          <a:lstStyle/>
+          <a:p>
+            <a:endParaRPr lang="en-US"/>
+          </a:p>
+        </p:txBody>
+      </p:sp>
+      <p:sp>
+        <p:nvSpPr>
+          <p:cNvPr id="4" name="Slide Number Placeholder 3"/>
+          <p:cNvSpPr>
+            <a:spLocks noGrp="1"/>
+          </p:cNvSpPr>
+          <p:nvPr>
+            <p:ph type="sldNum" sz="quarter" idx="5"/>
+          </p:nvPr>
+        </p:nvSpPr>
+        <p:spPr/>
+        <p:txBody>
+          <a:bodyPr/>
+          <a:lstStyle/>
+          <a:p>
+            <a:fld id="{2F99E83D-10BD-4912-838C-C14C2B9472B3}" type="slidenum">
+              <a:rPr lang="fr-FR" smtClean="0"/>
+              <a:t>6</a:t>
+            </a:fld>
+            <a:endParaRPr lang="fr-FR"/>
+          </a:p>
+        </p:txBody>
+      </p:sp>
+    </p:spTree>
+    <p:extLst>
+      <p:ext uri="{BB962C8B-B14F-4D97-AF65-F5344CB8AC3E}">
+        <p14:creationId xmlns:p14="http://schemas.microsoft.com/office/powerpoint/2010/main" val="1561302124"/>
       </p:ext>
     </p:extLst>
   </p:cSld>
@@ -7999,6 +8084,400 @@
     <p:extLst>
       <p:ext uri="{BB962C8B-B14F-4D97-AF65-F5344CB8AC3E}">
         <p14:creationId xmlns:p14="http://schemas.microsoft.com/office/powerpoint/2010/main" val="2627796234"/>
+      </p:ext>
+    </p:extLst>
+  </p:cSld>
+  <p:clrMapOvr>
+    <a:masterClrMapping/>
+  </p:clrMapOvr>
+  <p:timing>
+    <p:tnLst>
+      <p:par>
+        <p:cTn id="1" dur="indefinite" restart="never" nodeType="tmRoot">
+          <p:childTnLst>
+            <p:seq concurrent="1" nextAc="seek">
+              <p:cTn id="2" dur="indefinite" nodeType="mainSeq">
+                <p:childTnLst>
+                  <p:par>
+                    <p:cTn id="3" fill="hold">
+                      <p:stCondLst>
+                        <p:cond delay="indefinite"/>
+                      </p:stCondLst>
+                      <p:childTnLst>
+                        <p:par>
+                          <p:cTn id="4" fill="hold">
+                            <p:stCondLst>
+                              <p:cond delay="0"/>
+                            </p:stCondLst>
+                            <p:childTnLst>
+                              <p:par>
+                                <p:cTn id="5" presetID="1" presetClass="entr" presetSubtype="0" fill="hold" grpId="0" nodeType="clickEffect">
+                                  <p:stCondLst>
+                                    <p:cond delay="0"/>
+                                  </p:stCondLst>
+                                  <p:childTnLst>
+                                    <p:set>
+                                      <p:cBhvr>
+                                        <p:cTn id="6" dur="1" fill="hold">
+                                          <p:stCondLst>
+                                            <p:cond delay="0"/>
+                                          </p:stCondLst>
+                                        </p:cTn>
+                                        <p:tgtEl>
+                                          <p:spTgt spid="12"/>
+                                        </p:tgtEl>
+                                        <p:attrNameLst>
+                                          <p:attrName>style.visibility</p:attrName>
+                                        </p:attrNameLst>
+                                      </p:cBhvr>
+                                      <p:to>
+                                        <p:strVal val="visible"/>
+                                      </p:to>
+                                    </p:set>
+                                  </p:childTnLst>
+                                </p:cTn>
+                              </p:par>
+                            </p:childTnLst>
+                          </p:cTn>
+                        </p:par>
+                      </p:childTnLst>
+                    </p:cTn>
+                  </p:par>
+                </p:childTnLst>
+              </p:cTn>
+              <p:prevCondLst>
+                <p:cond evt="onPrev" delay="0">
+                  <p:tgtEl>
+                    <p:sldTgt/>
+                  </p:tgtEl>
+                </p:cond>
+              </p:prevCondLst>
+              <p:nextCondLst>
+                <p:cond evt="onNext" delay="0">
+                  <p:tgtEl>
+                    <p:sldTgt/>
+                  </p:tgtEl>
+                </p:cond>
+              </p:nextCondLst>
+            </p:seq>
+          </p:childTnLst>
+        </p:cTn>
+      </p:par>
+    </p:tnLst>
+    <p:bldLst>
+      <p:bldP spid="12" grpId="0" animBg="1"/>
+    </p:bldLst>
+  </p:timing>
+</p:sld>
+</file>
+
+<file path=ppt/slides/slide6.xml><?xml version="1.0" encoding="utf-8"?>
+<p:sld xmlns:a="http://schemas.openxmlformats.org/drawingml/2006/main" xmlns:r="http://schemas.openxmlformats.org/officeDocument/2006/relationships" xmlns:p="http://schemas.openxmlformats.org/presentationml/2006/main">
+  <p:cSld>
+    <p:spTree>
+      <p:nvGrpSpPr>
+        <p:cNvPr id="1" name=""/>
+        <p:cNvGrpSpPr/>
+        <p:nvPr/>
+      </p:nvGrpSpPr>
+      <p:grpSpPr>
+        <a:xfrm>
+          <a:off x="0" y="0"/>
+          <a:ext cx="0" cy="0"/>
+          <a:chOff x="0" y="0"/>
+          <a:chExt cx="0" cy="0"/>
+        </a:xfrm>
+      </p:grpSpPr>
+      <p:sp>
+        <p:nvSpPr>
+          <p:cNvPr id="3" name="Title 2">
+            <a:extLst>
+              <a:ext uri="{FF2B5EF4-FFF2-40B4-BE49-F238E27FC236}">
+                <a16:creationId xmlns:a16="http://schemas.microsoft.com/office/drawing/2014/main" id="{DF7A1D2C-E5F2-8583-01FC-D1AB8803987A}"/>
+              </a:ext>
+            </a:extLst>
+          </p:cNvPr>
+          <p:cNvSpPr>
+            <a:spLocks noGrp="1"/>
+          </p:cNvSpPr>
+          <p:nvPr>
+            <p:ph type="title"/>
+          </p:nvPr>
+        </p:nvSpPr>
+        <p:spPr>
+          <a:xfrm>
+            <a:off x="504832" y="241307"/>
+            <a:ext cx="11182351" cy="705519"/>
+          </a:xfrm>
+        </p:spPr>
+        <p:txBody>
+          <a:bodyPr>
+            <a:normAutofit/>
+          </a:bodyPr>
+          <a:lstStyle/>
+          <a:p>
+            <a:r>
+              <a:rPr lang="nb-NO" sz="3200"/>
+              <a:t>«Alle» Leverandører skal ha GPT funksjonalitet</a:t>
+            </a:r>
+            <a:endParaRPr lang="en-US" sz="3200"/>
+          </a:p>
+        </p:txBody>
+      </p:sp>
+      <p:pic>
+        <p:nvPicPr>
+          <p:cNvPr id="5" name="Picture 4">
+            <a:extLst>
+              <a:ext uri="{FF2B5EF4-FFF2-40B4-BE49-F238E27FC236}">
+                <a16:creationId xmlns:a16="http://schemas.microsoft.com/office/drawing/2014/main" id="{00337CE4-0B11-10E5-3CD1-936E80939081}"/>
+              </a:ext>
+            </a:extLst>
+          </p:cNvPr>
+          <p:cNvPicPr>
+            <a:picLocks noChangeAspect="1"/>
+          </p:cNvPicPr>
+          <p:nvPr/>
+        </p:nvPicPr>
+        <p:blipFill>
+          <a:blip r:embed="rId3"/>
+          <a:stretch>
+            <a:fillRect/>
+          </a:stretch>
+        </p:blipFill>
+        <p:spPr>
+          <a:xfrm>
+            <a:off x="707220" y="1586300"/>
+            <a:ext cx="5515879" cy="1728052"/>
+          </a:xfrm>
+          <a:prstGeom prst="rect">
+            <a:avLst/>
+          </a:prstGeom>
+        </p:spPr>
+      </p:pic>
+      <p:pic>
+        <p:nvPicPr>
+          <p:cNvPr id="7" name="Picture 6">
+            <a:extLst>
+              <a:ext uri="{FF2B5EF4-FFF2-40B4-BE49-F238E27FC236}">
+                <a16:creationId xmlns:a16="http://schemas.microsoft.com/office/drawing/2014/main" id="{A26574EB-04E9-926D-155E-F46A01ACA03C}"/>
+              </a:ext>
+            </a:extLst>
+          </p:cNvPr>
+          <p:cNvPicPr>
+            <a:picLocks noChangeAspect="1"/>
+          </p:cNvPicPr>
+          <p:nvPr/>
+        </p:nvPicPr>
+        <p:blipFill>
+          <a:blip r:embed="rId4"/>
+          <a:stretch>
+            <a:fillRect/>
+          </a:stretch>
+        </p:blipFill>
+        <p:spPr>
+          <a:xfrm>
+            <a:off x="6225236" y="1772455"/>
+            <a:ext cx="5735174" cy="1134814"/>
+          </a:xfrm>
+          <a:prstGeom prst="rect">
+            <a:avLst/>
+          </a:prstGeom>
+        </p:spPr>
+      </p:pic>
+      <p:pic>
+        <p:nvPicPr>
+          <p:cNvPr id="10" name="Picture 9">
+            <a:extLst>
+              <a:ext uri="{FF2B5EF4-FFF2-40B4-BE49-F238E27FC236}">
+                <a16:creationId xmlns:a16="http://schemas.microsoft.com/office/drawing/2014/main" id="{81DF88F8-5AF0-52EB-B3D7-03589102B2AB}"/>
+              </a:ext>
+            </a:extLst>
+          </p:cNvPr>
+          <p:cNvPicPr>
+            <a:picLocks noChangeAspect="1"/>
+          </p:cNvPicPr>
+          <p:nvPr/>
+        </p:nvPicPr>
+        <p:blipFill>
+          <a:blip r:embed="rId5"/>
+          <a:stretch>
+            <a:fillRect/>
+          </a:stretch>
+        </p:blipFill>
+        <p:spPr>
+          <a:xfrm>
+            <a:off x="529826" y="3468268"/>
+            <a:ext cx="11250595" cy="1076475"/>
+          </a:xfrm>
+          <a:prstGeom prst="rect">
+            <a:avLst/>
+          </a:prstGeom>
+        </p:spPr>
+      </p:pic>
+      <p:sp>
+        <p:nvSpPr>
+          <p:cNvPr id="12" name="Rectangle: Rounded Corners 8">
+            <a:extLst>
+              <a:ext uri="{FF2B5EF4-FFF2-40B4-BE49-F238E27FC236}">
+                <a16:creationId xmlns:a16="http://schemas.microsoft.com/office/drawing/2014/main" id="{39886BAE-EA11-DC76-96CF-E45100801F2E}"/>
+              </a:ext>
+            </a:extLst>
+          </p:cNvPr>
+          <p:cNvSpPr/>
+          <p:nvPr/>
+        </p:nvSpPr>
+        <p:spPr>
+          <a:xfrm>
+            <a:off x="3149113" y="4753991"/>
+            <a:ext cx="5849655" cy="1038432"/>
+          </a:xfrm>
+          <a:prstGeom prst="roundRect">
+            <a:avLst/>
+          </a:prstGeom>
+          <a:solidFill>
+            <a:srgbClr val="FF0000"/>
+          </a:solidFill>
+          <a:ln w="3175">
+            <a:noFill/>
+          </a:ln>
+        </p:spPr>
+        <p:style>
+          <a:lnRef idx="2">
+            <a:schemeClr val="accent1">
+              <a:shade val="50000"/>
+            </a:schemeClr>
+          </a:lnRef>
+          <a:fillRef idx="1">
+            <a:schemeClr val="accent1"/>
+          </a:fillRef>
+          <a:effectRef idx="0">
+            <a:schemeClr val="accent1"/>
+          </a:effectRef>
+          <a:fontRef idx="minor">
+            <a:schemeClr val="lt1"/>
+          </a:fontRef>
+        </p:style>
+        <p:txBody>
+          <a:bodyPr rot="0" spcFirstLastPara="0" vertOverflow="overflow" horzOverflow="overflow" vert="horz" wrap="square" lIns="91440" tIns="45720" rIns="91440" bIns="45720" numCol="1" spcCol="0" rtlCol="0" fromWordArt="0" anchor="ctr" anchorCtr="0" forceAA="0" compatLnSpc="1">
+            <a:prstTxWarp prst="textNoShape">
+              <a:avLst/>
+            </a:prstTxWarp>
+            <a:noAutofit/>
+          </a:bodyPr>
+          <a:lstStyle/>
+          <a:p>
+            <a:pPr algn="ctr"/>
+            <a:r>
+              <a:rPr lang="nb-NO" sz="2800" b="1">
+                <a:solidFill>
+                  <a:schemeClr val="bg1"/>
+                </a:solidFill>
+              </a:rPr>
+              <a:t>Handler om å forenkle informasjon</a:t>
+            </a:r>
+            <a:endParaRPr lang="en-US" sz="2800" b="1">
+              <a:solidFill>
+                <a:schemeClr val="bg1"/>
+              </a:solidFill>
+            </a:endParaRPr>
+          </a:p>
+        </p:txBody>
+      </p:sp>
+      <p:sp>
+        <p:nvSpPr>
+          <p:cNvPr id="2" name="Title 2">
+            <a:extLst>
+              <a:ext uri="{FF2B5EF4-FFF2-40B4-BE49-F238E27FC236}">
+                <a16:creationId xmlns:a16="http://schemas.microsoft.com/office/drawing/2014/main" id="{A04E580A-C705-BF13-F2B0-20B9C7F55270}"/>
+              </a:ext>
+            </a:extLst>
+          </p:cNvPr>
+          <p:cNvSpPr txBox="1">
+            <a:spLocks/>
+          </p:cNvSpPr>
+          <p:nvPr/>
+        </p:nvSpPr>
+        <p:spPr bwMode="auto">
+          <a:xfrm>
+            <a:off x="598070" y="758174"/>
+            <a:ext cx="11182351" cy="705519"/>
+          </a:xfrm>
+          <a:prstGeom prst="rect">
+            <a:avLst/>
+          </a:prstGeom>
+          <a:noFill/>
+          <a:ln>
+            <a:noFill/>
+          </a:ln>
+          <a:effectLst/>
+          <a:extLst>
+            <a:ext uri="{909E8E84-426E-40DD-AFC4-6F175D3DCCD1}">
+              <a14:hiddenFill xmlns:a14="http://schemas.microsoft.com/office/drawing/2010/main">
+                <a:solidFill>
+                  <a:schemeClr val="accent1"/>
+                </a:solidFill>
+              </a14:hiddenFill>
+            </a:ext>
+            <a:ext uri="{91240B29-F687-4F45-9708-019B960494DF}">
+              <a14:hiddenLine xmlns:a14="http://schemas.microsoft.com/office/drawing/2010/main" w="9525">
+                <a:solidFill>
+                  <a:schemeClr val="tx1"/>
+                </a:solidFill>
+                <a:miter lim="800000"/>
+                <a:headEnd/>
+                <a:tailEnd/>
+              </a14:hiddenLine>
+            </a:ext>
+            <a:ext uri="{AF507438-7753-43E0-B8FC-AC1667EBCBE1}">
+              <a14:hiddenEffects xmlns:a14="http://schemas.microsoft.com/office/drawing/2010/main">
+                <a:effectLst>
+                  <a:outerShdw dist="35921" dir="2700000" algn="ctr" rotWithShape="0">
+                    <a:schemeClr val="bg2"/>
+                  </a:outerShdw>
+                </a:effectLst>
+              </a14:hiddenEffects>
+            </a:ext>
+          </a:extLst>
+        </p:spPr>
+        <p:txBody>
+          <a:bodyPr vert="horz" wrap="square" lIns="91440" tIns="45720" rIns="91440" bIns="45720" numCol="1" rtlCol="0" anchor="b" anchorCtr="0" compatLnSpc="1">
+            <a:prstTxWarp prst="textNoShape">
+              <a:avLst/>
+            </a:prstTxWarp>
+            <a:normAutofit/>
+          </a:bodyPr>
+          <a:lstStyle>
+            <a:lvl1pPr algn="l" defTabSz="914400" rtl="0" eaLnBrk="1" latinLnBrk="0" hangingPunct="1">
+              <a:lnSpc>
+                <a:spcPct val="90000"/>
+              </a:lnSpc>
+              <a:spcBef>
+                <a:spcPct val="0"/>
+              </a:spcBef>
+              <a:buNone/>
+              <a:defRPr sz="4400" kern="1200">
+                <a:solidFill>
+                  <a:schemeClr val="tx1"/>
+                </a:solidFill>
+                <a:latin typeface="+mj-lt"/>
+                <a:ea typeface="+mj-ea"/>
+                <a:cs typeface="+mj-cs"/>
+              </a:defRPr>
+            </a:lvl1pPr>
+          </a:lstStyle>
+          <a:p>
+            <a:r>
+              <a:rPr lang="nb-NO" sz="3200" dirty="0"/>
+              <a:t>Dette er endringer gjort på branch 2, gjør boks rød her</a:t>
+            </a:r>
+            <a:endParaRPr lang="en-US" sz="3200" dirty="0"/>
+          </a:p>
+        </p:txBody>
+      </p:sp>
+    </p:spTree>
+    <p:extLst>
+      <p:ext uri="{BB962C8B-B14F-4D97-AF65-F5344CB8AC3E}">
+        <p14:creationId xmlns:p14="http://schemas.microsoft.com/office/powerpoint/2010/main" val="171245847"/>
       </p:ext>
     </p:extLst>
   </p:cSld>

</xml_diff>

<commit_message>
endret text og text bod
</commit_message>
<xml_diff>
--- a/Test1.pptx
+++ b/Test1.pptx
@@ -7829,10 +7829,10 @@
           <a:lstStyle/>
           <a:p>
             <a:r>
-              <a:rPr lang="nb-NO" sz="3200"/>
+              <a:rPr lang="nb-NO" sz="3200" dirty="0"/>
               <a:t>«Alle» Leverandører skal ha GPT funksjonalitet</a:t>
             </a:r>
-            <a:endParaRPr lang="en-US" sz="3200"/>
+            <a:endParaRPr lang="en-US" sz="3200" dirty="0"/>
           </a:p>
         </p:txBody>
       </p:sp>
@@ -7947,7 +7947,7 @@
             <a:avLst/>
           </a:prstGeom>
           <a:solidFill>
-            <a:schemeClr val="accent2"/>
+            <a:srgbClr val="92D050"/>
           </a:solidFill>
           <a:ln w="3175">
             <a:noFill/>
@@ -7980,18 +7980,113 @@
           <a:p>
             <a:pPr algn="ctr"/>
             <a:r>
-              <a:rPr lang="nb-NO" sz="2800" b="1">
+              <a:rPr lang="nb-NO" sz="2800" b="1" dirty="0">
                 <a:solidFill>
                   <a:schemeClr val="bg1"/>
                 </a:solidFill>
               </a:rPr>
               <a:t>Handler om å forenkle informasjon</a:t>
             </a:r>
-            <a:endParaRPr lang="en-US" sz="2800" b="1">
+            <a:endParaRPr lang="en-US" sz="2800" b="1" dirty="0">
               <a:solidFill>
                 <a:schemeClr val="bg1"/>
               </a:solidFill>
             </a:endParaRPr>
+          </a:p>
+        </p:txBody>
+      </p:sp>
+      <p:sp>
+        <p:nvSpPr>
+          <p:cNvPr id="2" name="Title 2">
+            <a:extLst>
+              <a:ext uri="{FF2B5EF4-FFF2-40B4-BE49-F238E27FC236}">
+                <a16:creationId xmlns:a16="http://schemas.microsoft.com/office/drawing/2014/main" id="{DFDDA360-5BE4-E250-0FBC-64D266C2434E}"/>
+              </a:ext>
+            </a:extLst>
+          </p:cNvPr>
+          <p:cNvSpPr txBox="1">
+            <a:spLocks/>
+          </p:cNvSpPr>
+          <p:nvPr/>
+        </p:nvSpPr>
+        <p:spPr bwMode="auto">
+          <a:xfrm>
+            <a:off x="529826" y="712817"/>
+            <a:ext cx="11182351" cy="705519"/>
+          </a:xfrm>
+          <a:prstGeom prst="rect">
+            <a:avLst/>
+          </a:prstGeom>
+          <a:noFill/>
+          <a:ln>
+            <a:noFill/>
+          </a:ln>
+          <a:effectLst/>
+          <a:extLst>
+            <a:ext uri="{909E8E84-426E-40DD-AFC4-6F175D3DCCD1}">
+              <a14:hiddenFill xmlns:a14="http://schemas.microsoft.com/office/drawing/2010/main">
+                <a:solidFill>
+                  <a:schemeClr val="accent1"/>
+                </a:solidFill>
+              </a14:hiddenFill>
+            </a:ext>
+            <a:ext uri="{91240B29-F687-4F45-9708-019B960494DF}">
+              <a14:hiddenLine xmlns:a14="http://schemas.microsoft.com/office/drawing/2010/main" w="9525">
+                <a:solidFill>
+                  <a:schemeClr val="tx1"/>
+                </a:solidFill>
+                <a:miter lim="800000"/>
+                <a:headEnd/>
+                <a:tailEnd/>
+              </a14:hiddenLine>
+            </a:ext>
+            <a:ext uri="{AF507438-7753-43E0-B8FC-AC1667EBCBE1}">
+              <a14:hiddenEffects xmlns:a14="http://schemas.microsoft.com/office/drawing/2010/main">
+                <a:effectLst>
+                  <a:outerShdw dist="35921" dir="2700000" algn="ctr" rotWithShape="0">
+                    <a:schemeClr val="bg2"/>
+                  </a:outerShdw>
+                </a:effectLst>
+              </a14:hiddenEffects>
+            </a:ext>
+          </a:extLst>
+        </p:spPr>
+        <p:txBody>
+          <a:bodyPr vert="horz" wrap="square" lIns="91440" tIns="45720" rIns="91440" bIns="45720" numCol="1" rtlCol="0" anchor="b" anchorCtr="0" compatLnSpc="1">
+            <a:prstTxWarp prst="textNoShape">
+              <a:avLst/>
+            </a:prstTxWarp>
+            <a:normAutofit/>
+          </a:bodyPr>
+          <a:lstStyle>
+            <a:lvl1pPr algn="l" defTabSz="914400" rtl="0" eaLnBrk="1" latinLnBrk="0" hangingPunct="1">
+              <a:lnSpc>
+                <a:spcPct val="90000"/>
+              </a:lnSpc>
+              <a:spcBef>
+                <a:spcPct val="0"/>
+              </a:spcBef>
+              <a:buNone/>
+              <a:defRPr sz="4400" kern="1200">
+                <a:solidFill>
+                  <a:schemeClr val="tx1"/>
+                </a:solidFill>
+                <a:latin typeface="+mj-lt"/>
+                <a:ea typeface="+mj-ea"/>
+                <a:cs typeface="+mj-cs"/>
+              </a:defRPr>
+            </a:lvl1pPr>
+          </a:lstStyle>
+          <a:p>
+            <a:r>
+              <a:rPr lang="nb-NO" sz="3200" dirty="0"/>
+              <a:t>Main </a:t>
+            </a:r>
+            <a:r>
+              <a:rPr lang="nb-NO" sz="3200"/>
+              <a:t>branch endringen her gjør jeg denne grønn</a:t>
+            </a:r>
+            <a:endParaRPr lang="en-US" sz="3200" dirty="0"/>
           </a:p>
         </p:txBody>
       </p:sp>

</xml_diff>